<commit_message>
Removes reference to "our work" to blind review
</commit_message>
<xml_diff>
--- a/paper/figures/ossmodelv2.pptx
+++ b/paper/figures/ossmodelv2.pptx
@@ -106,7 +106,7 @@
   </p:defaultTextStyle>
   <p:extLst>
     <p:ext uri="{EFAFB233-063F-42B5-8137-9DF3F51BA10A}">
-      <p15:sldGuideLst xmlns:p15="http://schemas.microsoft.com/office/powerpoint/2012/main"/>
+      <p15:sldGuideLst xmlns:p15="http://schemas.microsoft.com/office/powerpoint/2012/main" xmlns=""/>
     </p:ext>
   </p:extLst>
 </p:presentation>
@@ -243,7 +243,7 @@
           <a:p>
             <a:fld id="{22AFB721-CA95-45B3-BB9E-6773B16C5DD7}" type="datetimeFigureOut">
               <a:rPr lang="en-US" smtClean="0"/>
-              <a:t>8/15/2016</a:t>
+              <a:t>8/15/16</a:t>
             </a:fld>
             <a:endParaRPr lang="en-US"/>
           </a:p>
@@ -413,7 +413,7 @@
           <a:p>
             <a:fld id="{22AFB721-CA95-45B3-BB9E-6773B16C5DD7}" type="datetimeFigureOut">
               <a:rPr lang="en-US" smtClean="0"/>
-              <a:t>8/15/2016</a:t>
+              <a:t>8/15/16</a:t>
             </a:fld>
             <a:endParaRPr lang="en-US"/>
           </a:p>
@@ -593,7 +593,7 @@
           <a:p>
             <a:fld id="{22AFB721-CA95-45B3-BB9E-6773B16C5DD7}" type="datetimeFigureOut">
               <a:rPr lang="en-US" smtClean="0"/>
-              <a:t>8/15/2016</a:t>
+              <a:t>8/15/16</a:t>
             </a:fld>
             <a:endParaRPr lang="en-US"/>
           </a:p>
@@ -763,7 +763,7 @@
           <a:p>
             <a:fld id="{22AFB721-CA95-45B3-BB9E-6773B16C5DD7}" type="datetimeFigureOut">
               <a:rPr lang="en-US" smtClean="0"/>
-              <a:t>8/15/2016</a:t>
+              <a:t>8/15/16</a:t>
             </a:fld>
             <a:endParaRPr lang="en-US"/>
           </a:p>
@@ -1009,7 +1009,7 @@
           <a:p>
             <a:fld id="{22AFB721-CA95-45B3-BB9E-6773B16C5DD7}" type="datetimeFigureOut">
               <a:rPr lang="en-US" smtClean="0"/>
-              <a:t>8/15/2016</a:t>
+              <a:t>8/15/16</a:t>
             </a:fld>
             <a:endParaRPr lang="en-US"/>
           </a:p>
@@ -1241,7 +1241,7 @@
           <a:p>
             <a:fld id="{22AFB721-CA95-45B3-BB9E-6773B16C5DD7}" type="datetimeFigureOut">
               <a:rPr lang="en-US" smtClean="0"/>
-              <a:t>8/15/2016</a:t>
+              <a:t>8/15/16</a:t>
             </a:fld>
             <a:endParaRPr lang="en-US"/>
           </a:p>
@@ -1608,7 +1608,7 @@
           <a:p>
             <a:fld id="{22AFB721-CA95-45B3-BB9E-6773B16C5DD7}" type="datetimeFigureOut">
               <a:rPr lang="en-US" smtClean="0"/>
-              <a:t>8/15/2016</a:t>
+              <a:t>8/15/16</a:t>
             </a:fld>
             <a:endParaRPr lang="en-US"/>
           </a:p>
@@ -1726,7 +1726,7 @@
           <a:p>
             <a:fld id="{22AFB721-CA95-45B3-BB9E-6773B16C5DD7}" type="datetimeFigureOut">
               <a:rPr lang="en-US" smtClean="0"/>
-              <a:t>8/15/2016</a:t>
+              <a:t>8/15/16</a:t>
             </a:fld>
             <a:endParaRPr lang="en-US"/>
           </a:p>
@@ -1821,7 +1821,7 @@
           <a:p>
             <a:fld id="{22AFB721-CA95-45B3-BB9E-6773B16C5DD7}" type="datetimeFigureOut">
               <a:rPr lang="en-US" smtClean="0"/>
-              <a:t>8/15/2016</a:t>
+              <a:t>8/15/16</a:t>
             </a:fld>
             <a:endParaRPr lang="en-US"/>
           </a:p>
@@ -2098,7 +2098,7 @@
           <a:p>
             <a:fld id="{22AFB721-CA95-45B3-BB9E-6773B16C5DD7}" type="datetimeFigureOut">
               <a:rPr lang="en-US" smtClean="0"/>
-              <a:t>8/15/2016</a:t>
+              <a:t>8/15/16</a:t>
             </a:fld>
             <a:endParaRPr lang="en-US"/>
           </a:p>
@@ -2351,7 +2351,7 @@
           <a:p>
             <a:fld id="{22AFB721-CA95-45B3-BB9E-6773B16C5DD7}" type="datetimeFigureOut">
               <a:rPr lang="en-US" smtClean="0"/>
-              <a:t>8/15/2016</a:t>
+              <a:t>8/15/16</a:t>
             </a:fld>
             <a:endParaRPr lang="en-US"/>
           </a:p>
@@ -2564,7 +2564,7 @@
           <a:p>
             <a:fld id="{22AFB721-CA95-45B3-BB9E-6773B16C5DD7}" type="datetimeFigureOut">
               <a:rPr lang="en-US" smtClean="0"/>
-              <a:t>8/15/2016</a:t>
+              <a:t>8/15/16</a:t>
             </a:fld>
             <a:endParaRPr lang="en-US"/>
           </a:p>
@@ -3154,7 +3154,7 @@
             </a:prstGeom>
             <a:noFill/>
             <a:extLst>
-              <a:ext uri="{909E8E84-426E-40DD-AFC4-6F175D3DCCD1}">
+              <a:ext uri="{909E8E84-426E-40dd-AFC4-6F175D3DCCD1}">
                 <a14:hiddenFill xmlns:a14="http://schemas.microsoft.com/office/drawing/2010/main">
                   <a:solidFill>
                     <a:srgbClr val="FFFFFF"/>
@@ -3783,7 +3783,7 @@
                   <a:schemeClr val="tx1"/>
                 </a:solidFill>
               </a:rPr>
-              <a:t>1</a:t>
+              <a:t>2</a:t>
             </a:r>
             <a:endParaRPr lang="en-US" dirty="0">
               <a:solidFill>
@@ -3838,7 +3838,7 @@
                   <a:schemeClr val="tx1"/>
                 </a:solidFill>
               </a:rPr>
-              <a:t>2</a:t>
+              <a:t>3</a:t>
             </a:r>
             <a:endParaRPr lang="en-US" dirty="0">
               <a:solidFill>
@@ -3856,7 +3856,7 @@
         </p:nvSpPr>
         <p:spPr>
           <a:xfrm>
-            <a:off x="10116606" y="683059"/>
+            <a:off x="10138887" y="683059"/>
             <a:ext cx="354830" cy="354830"/>
           </a:xfrm>
           <a:prstGeom prst="ellipse">
@@ -3888,13 +3888,18 @@
           <a:p>
             <a:pPr algn="ctr"/>
             <a:r>
-              <a:rPr lang="en-US" dirty="0">
+              <a:rPr lang="en-US" dirty="0" smtClean="0">
                 <a:solidFill>
                   <a:schemeClr val="tx1"/>
                 </a:solidFill>
               </a:rPr>
-              <a:t>3</a:t>
-            </a:r>
+              <a:t>4</a:t>
+            </a:r>
+            <a:endParaRPr lang="en-US" dirty="0">
+              <a:solidFill>
+                <a:schemeClr val="tx1"/>
+              </a:solidFill>
+            </a:endParaRPr>
           </a:p>
         </p:txBody>
       </p:sp>
@@ -3938,13 +3943,18 @@
           <a:p>
             <a:pPr algn="ctr"/>
             <a:r>
-              <a:rPr lang="en-US" dirty="0">
+              <a:rPr lang="en-US" dirty="0" smtClean="0">
                 <a:solidFill>
                   <a:schemeClr val="tx1"/>
                 </a:solidFill>
               </a:rPr>
-              <a:t>4</a:t>
-            </a:r>
+              <a:t>1</a:t>
+            </a:r>
+            <a:endParaRPr lang="en-US" dirty="0">
+              <a:solidFill>
+                <a:schemeClr val="tx1"/>
+              </a:solidFill>
+            </a:endParaRPr>
           </a:p>
         </p:txBody>
       </p:sp>
@@ -4004,7 +4014,7 @@
     </a:clrScheme>
     <a:fontScheme name="Office">
       <a:majorFont>
-        <a:latin typeface="Calibri Light" panose="020F0302020204030204"/>
+        <a:latin typeface="Calibri Light"/>
         <a:ea typeface=""/>
         <a:cs typeface=""/>
         <a:font script="Jpan" typeface="ＭＳ Ｐゴシック"/>
@@ -4039,7 +4049,7 @@
         <a:font script="Geor" typeface="Sylfaen"/>
       </a:majorFont>
       <a:minorFont>
-        <a:latin typeface="Calibri" panose="020F0502020204030204"/>
+        <a:latin typeface="Calibri"/>
         <a:ea typeface=""/>
         <a:cs typeface=""/>
         <a:font script="Jpan" typeface="ＭＳ Ｐゴシック"/>
@@ -4216,7 +4226,7 @@
   <a:extraClrSchemeLst/>
   <a:extLst>
     <a:ext uri="{05A4C25C-085E-4340-85A3-A5531E510DB2}">
-      <thm15:themeFamily xmlns:thm15="http://schemas.microsoft.com/office/thememl/2012/main" name="Office Theme" id="{62F939B6-93AF-4DB8-9C6B-D6C7DFDC589F}" vid="{4A3C46E8-61CC-4603-A589-7422A47A8E4A}"/>
+      <thm15:themeFamily xmlns:thm15="http://schemas.microsoft.com/office/thememl/2012/main" xmlns="" name="Office Theme" id="{62F939B6-93AF-4DB8-9C6B-D6C7DFDC589F}" vid="{4A3C46E8-61CC-4603-A589-7422A47A8E4A}"/>
     </a:ext>
   </a:extLst>
 </a:theme>

</xml_diff>

<commit_message>
Fixes reference to figure
</commit_message>
<xml_diff>
--- a/paper/figures/ossmodelv2.pptx
+++ b/paper/figures/ossmodelv2.pptx
@@ -3028,7 +3028,7 @@
         </p:blipFill>
         <p:spPr>
           <a:xfrm>
-            <a:off x="6826121" y="4419958"/>
+            <a:off x="6023997" y="4419958"/>
             <a:ext cx="1687067" cy="1362731"/>
           </a:xfrm>
           <a:prstGeom prst="rect">
@@ -3285,7 +3285,7 @@
         </p:blipFill>
         <p:spPr>
           <a:xfrm>
-            <a:off x="5531245" y="4592548"/>
+            <a:off x="3659623" y="4503429"/>
             <a:ext cx="778188" cy="1008284"/>
           </a:xfrm>
           <a:prstGeom prst="rect">
@@ -3315,7 +3315,7 @@
         </p:blipFill>
         <p:spPr>
           <a:xfrm>
-            <a:off x="5933398" y="5658807"/>
+            <a:off x="4061776" y="5569688"/>
             <a:ext cx="1071545" cy="446025"/>
           </a:xfrm>
           <a:prstGeom prst="rect">
@@ -3343,7 +3343,7 @@
         </p:blipFill>
         <p:spPr>
           <a:xfrm>
-            <a:off x="4577863" y="4596108"/>
+            <a:off x="2706241" y="4506989"/>
             <a:ext cx="845057" cy="958057"/>
           </a:xfrm>
           <a:prstGeom prst="rect">
@@ -3373,7 +3373,7 @@
         </p:blipFill>
         <p:spPr>
           <a:xfrm>
-            <a:off x="4012372" y="5056610"/>
+            <a:off x="2140750" y="4967491"/>
             <a:ext cx="547254" cy="544222"/>
           </a:xfrm>
           <a:prstGeom prst="rect">
@@ -3519,7 +3519,7 @@
         </p:blipFill>
         <p:spPr>
           <a:xfrm>
-            <a:off x="4039405" y="5536985"/>
+            <a:off x="2167783" y="5447866"/>
             <a:ext cx="2019300" cy="628650"/>
           </a:xfrm>
           <a:prstGeom prst="rect">
@@ -3566,13 +3566,15 @@
       <p:cxnSp>
         <p:nvCxnSpPr>
           <p:cNvPr id="63" name="Straight Arrow Connector 62"/>
-          <p:cNvCxnSpPr/>
+          <p:cNvCxnSpPr>
+            <a:stCxn id="14" idx="1"/>
+          </p:cNvCxnSpPr>
           <p:nvPr/>
         </p:nvCxnSpPr>
         <p:spPr>
-          <a:xfrm flipH="1" flipV="1">
-            <a:off x="6280957" y="5196703"/>
-            <a:ext cx="496748" cy="9028"/>
+          <a:xfrm flipH="1">
+            <a:off x="4409335" y="5101324"/>
+            <a:ext cx="1614662" cy="6260"/>
           </a:xfrm>
           <a:prstGeom prst="straightConnector1">
             <a:avLst/>
@@ -3668,14 +3670,14 @@
         <p:nvCxnSpPr>
           <p:cNvPr id="89" name="Straight Arrow Connector 88"/>
           <p:cNvCxnSpPr>
-            <a:endCxn id="14" idx="3"/>
+            <a:stCxn id="5" idx="4"/>
           </p:cNvCxnSpPr>
           <p:nvPr/>
         </p:nvCxnSpPr>
         <p:spPr>
           <a:xfrm flipH="1">
-            <a:off x="8513188" y="2472158"/>
-            <a:ext cx="1360795" cy="2629166"/>
+            <a:off x="7742721" y="2433490"/>
+            <a:ext cx="2493885" cy="2902521"/>
           </a:xfrm>
           <a:prstGeom prst="straightConnector1">
             <a:avLst/>
@@ -3711,7 +3713,7 @@
         <p:spPr>
           <a:xfrm flipH="1" flipV="1">
             <a:off x="6356194" y="2673514"/>
-            <a:ext cx="774886" cy="1885818"/>
+            <a:ext cx="16232" cy="1815865"/>
           </a:xfrm>
           <a:prstGeom prst="straightConnector1">
             <a:avLst/>
@@ -3746,8 +3748,8 @@
         </p:nvSpPr>
         <p:spPr>
           <a:xfrm>
-            <a:off x="5695024" y="2317228"/>
-            <a:ext cx="354830" cy="354830"/>
+            <a:off x="5548021" y="2194560"/>
+            <a:ext cx="501833" cy="477498"/>
           </a:xfrm>
           <a:prstGeom prst="ellipse">
             <a:avLst/>
@@ -3778,14 +3780,14 @@
           <a:p>
             <a:pPr algn="ctr"/>
             <a:r>
-              <a:rPr lang="en-US" dirty="0" smtClean="0">
+              <a:rPr lang="en-US" sz="2400" b="1" dirty="0" smtClean="0">
                 <a:solidFill>
                   <a:schemeClr val="tx1"/>
                 </a:solidFill>
               </a:rPr>
               <a:t>2</a:t>
             </a:r>
-            <a:endParaRPr lang="en-US" dirty="0">
+            <a:endParaRPr lang="en-US" sz="2400" b="1" dirty="0">
               <a:solidFill>
                 <a:schemeClr val="tx1"/>
               </a:solidFill>
@@ -3801,8 +3803,8 @@
         </p:nvSpPr>
         <p:spPr>
           <a:xfrm>
-            <a:off x="7847176" y="3792932"/>
-            <a:ext cx="354830" cy="354830"/>
+            <a:off x="7700173" y="3670264"/>
+            <a:ext cx="501833" cy="477498"/>
           </a:xfrm>
           <a:prstGeom prst="ellipse">
             <a:avLst/>
@@ -3833,14 +3835,14 @@
           <a:p>
             <a:pPr algn="ctr"/>
             <a:r>
-              <a:rPr lang="en-US" dirty="0" smtClean="0">
+              <a:rPr lang="en-US" sz="2400" b="1" dirty="0" smtClean="0">
                 <a:solidFill>
                   <a:schemeClr val="tx1"/>
                 </a:solidFill>
               </a:rPr>
               <a:t>3</a:t>
             </a:r>
-            <a:endParaRPr lang="en-US" dirty="0">
+            <a:endParaRPr lang="en-US" sz="2400" b="1" dirty="0">
               <a:solidFill>
                 <a:schemeClr val="tx1"/>
               </a:solidFill>
@@ -3856,8 +3858,8 @@
         </p:nvSpPr>
         <p:spPr>
           <a:xfrm>
-            <a:off x="10138887" y="683059"/>
-            <a:ext cx="354830" cy="354830"/>
+            <a:off x="9991884" y="560391"/>
+            <a:ext cx="501833" cy="477498"/>
           </a:xfrm>
           <a:prstGeom prst="ellipse">
             <a:avLst/>
@@ -3888,14 +3890,14 @@
           <a:p>
             <a:pPr algn="ctr"/>
             <a:r>
-              <a:rPr lang="en-US" dirty="0" smtClean="0">
+              <a:rPr lang="en-US" sz="2400" b="1" dirty="0" smtClean="0">
                 <a:solidFill>
                   <a:schemeClr val="tx1"/>
                 </a:solidFill>
               </a:rPr>
               <a:t>4</a:t>
             </a:r>
-            <a:endParaRPr lang="en-US" dirty="0">
+            <a:endParaRPr lang="en-US" sz="2400" b="1" dirty="0">
               <a:solidFill>
                 <a:schemeClr val="tx1"/>
               </a:solidFill>
@@ -3911,8 +3913,8 @@
         </p:nvSpPr>
         <p:spPr>
           <a:xfrm>
-            <a:off x="6383085" y="4709433"/>
-            <a:ext cx="354830" cy="354830"/>
+            <a:off x="4364460" y="4497646"/>
+            <a:ext cx="501833" cy="477498"/>
           </a:xfrm>
           <a:prstGeom prst="ellipse">
             <a:avLst/>
@@ -3943,14 +3945,14 @@
           <a:p>
             <a:pPr algn="ctr"/>
             <a:r>
-              <a:rPr lang="en-US" dirty="0" smtClean="0">
+              <a:rPr lang="en-US" sz="2400" b="1" dirty="0" smtClean="0">
                 <a:solidFill>
                   <a:schemeClr val="tx1"/>
                 </a:solidFill>
               </a:rPr>
               <a:t>1</a:t>
             </a:r>
-            <a:endParaRPr lang="en-US" dirty="0">
+            <a:endParaRPr lang="en-US" sz="2400" b="1" dirty="0">
               <a:solidFill>
                 <a:schemeClr val="tx1"/>
               </a:solidFill>

</xml_diff>